<commit_message>
week 3 python slides
</commit_message>
<xml_diff>
--- a/AI_Precourse/Week2_Latex.pptx
+++ b/AI_Precourse/Week2_Latex.pptx
@@ -5,7 +5,7 @@
     <p:sldMasterId id="2147483648" r:id="rId1"/>
   </p:sldMasterIdLst>
   <p:notesMasterIdLst>
-    <p:notesMasterId r:id="rId44"/>
+    <p:notesMasterId r:id="rId46"/>
   </p:notesMasterIdLst>
   <p:sldIdLst>
     <p:sldId id="256" r:id="rId2"/>
@@ -19,37 +19,39 @@
     <p:sldId id="332" r:id="rId10"/>
     <p:sldId id="336" r:id="rId11"/>
     <p:sldId id="337" r:id="rId12"/>
-    <p:sldId id="339" r:id="rId13"/>
-    <p:sldId id="340" r:id="rId14"/>
-    <p:sldId id="341" r:id="rId15"/>
-    <p:sldId id="343" r:id="rId16"/>
-    <p:sldId id="344" r:id="rId17"/>
-    <p:sldId id="338" r:id="rId18"/>
-    <p:sldId id="345" r:id="rId19"/>
-    <p:sldId id="346" r:id="rId20"/>
-    <p:sldId id="347" r:id="rId21"/>
-    <p:sldId id="348" r:id="rId22"/>
-    <p:sldId id="349" r:id="rId23"/>
-    <p:sldId id="350" r:id="rId24"/>
-    <p:sldId id="333" r:id="rId25"/>
-    <p:sldId id="334" r:id="rId26"/>
-    <p:sldId id="351" r:id="rId27"/>
-    <p:sldId id="352" r:id="rId28"/>
-    <p:sldId id="353" r:id="rId29"/>
-    <p:sldId id="354" r:id="rId30"/>
-    <p:sldId id="357" r:id="rId31"/>
-    <p:sldId id="359" r:id="rId32"/>
-    <p:sldId id="360" r:id="rId33"/>
-    <p:sldId id="361" r:id="rId34"/>
-    <p:sldId id="362" r:id="rId35"/>
-    <p:sldId id="364" r:id="rId36"/>
-    <p:sldId id="363" r:id="rId37"/>
-    <p:sldId id="365" r:id="rId38"/>
-    <p:sldId id="366" r:id="rId39"/>
-    <p:sldId id="358" r:id="rId40"/>
-    <p:sldId id="355" r:id="rId41"/>
-    <p:sldId id="356" r:id="rId42"/>
-    <p:sldId id="342" r:id="rId43"/>
+    <p:sldId id="367" r:id="rId13"/>
+    <p:sldId id="339" r:id="rId14"/>
+    <p:sldId id="340" r:id="rId15"/>
+    <p:sldId id="341" r:id="rId16"/>
+    <p:sldId id="343" r:id="rId17"/>
+    <p:sldId id="344" r:id="rId18"/>
+    <p:sldId id="338" r:id="rId19"/>
+    <p:sldId id="345" r:id="rId20"/>
+    <p:sldId id="346" r:id="rId21"/>
+    <p:sldId id="347" r:id="rId22"/>
+    <p:sldId id="348" r:id="rId23"/>
+    <p:sldId id="349" r:id="rId24"/>
+    <p:sldId id="350" r:id="rId25"/>
+    <p:sldId id="333" r:id="rId26"/>
+    <p:sldId id="334" r:id="rId27"/>
+    <p:sldId id="351" r:id="rId28"/>
+    <p:sldId id="352" r:id="rId29"/>
+    <p:sldId id="353" r:id="rId30"/>
+    <p:sldId id="354" r:id="rId31"/>
+    <p:sldId id="357" r:id="rId32"/>
+    <p:sldId id="359" r:id="rId33"/>
+    <p:sldId id="360" r:id="rId34"/>
+    <p:sldId id="361" r:id="rId35"/>
+    <p:sldId id="368" r:id="rId36"/>
+    <p:sldId id="362" r:id="rId37"/>
+    <p:sldId id="364" r:id="rId38"/>
+    <p:sldId id="363" r:id="rId39"/>
+    <p:sldId id="365" r:id="rId40"/>
+    <p:sldId id="366" r:id="rId41"/>
+    <p:sldId id="358" r:id="rId42"/>
+    <p:sldId id="355" r:id="rId43"/>
+    <p:sldId id="356" r:id="rId44"/>
+    <p:sldId id="342" r:id="rId45"/>
   </p:sldIdLst>
   <p:sldSz cx="12192000" cy="6858000"/>
   <p:notesSz cx="6858000" cy="9144000"/>
@@ -238,7 +240,7 @@
           <a:p>
             <a:fld id="{7D19DF80-F79F-43E6-A18A-9BE4C93656DA}" type="datetimeFigureOut">
               <a:rPr lang="zh-CN" altLang="en-US" smtClean="0"/>
-              <a:t>2019/3/25</a:t>
+              <a:t>2019/3/27</a:t>
             </a:fld>
             <a:endParaRPr lang="zh-CN" altLang="en-US"/>
           </a:p>
@@ -710,7 +712,7 @@
           <a:p>
             <a:fld id="{D0CA3166-A36D-43A3-A50C-6C4A4EA83EFC}" type="slidenum">
               <a:rPr lang="zh-CN" altLang="en-US" smtClean="0"/>
-              <a:t>18</a:t>
+              <a:t>19</a:t>
             </a:fld>
             <a:endParaRPr lang="zh-CN" altLang="en-US"/>
           </a:p>
@@ -810,7 +812,7 @@
           <a:p>
             <a:fld id="{D0CA3166-A36D-43A3-A50C-6C4A4EA83EFC}" type="slidenum">
               <a:rPr lang="zh-CN" altLang="en-US" smtClean="0"/>
-              <a:t>22</a:t>
+              <a:t>23</a:t>
             </a:fld>
             <a:endParaRPr lang="zh-CN" altLang="en-US"/>
           </a:p>
@@ -916,7 +918,7 @@
           <a:p>
             <a:fld id="{D0CA3166-A36D-43A3-A50C-6C4A4EA83EFC}" type="slidenum">
               <a:rPr lang="zh-CN" altLang="en-US" smtClean="0"/>
-              <a:t>24</a:t>
+              <a:t>25</a:t>
             </a:fld>
             <a:endParaRPr lang="zh-CN" altLang="en-US"/>
           </a:p>
@@ -1004,7 +1006,7 @@
           <a:p>
             <a:fld id="{D0CA3166-A36D-43A3-A50C-6C4A4EA83EFC}" type="slidenum">
               <a:rPr lang="zh-CN" altLang="en-US" smtClean="0"/>
-              <a:t>28</a:t>
+              <a:t>29</a:t>
             </a:fld>
             <a:endParaRPr lang="zh-CN" altLang="en-US"/>
           </a:p>
@@ -1110,7 +1112,7 @@
           <a:p>
             <a:fld id="{D0CA3166-A36D-43A3-A50C-6C4A4EA83EFC}" type="slidenum">
               <a:rPr lang="zh-CN" altLang="en-US" smtClean="0"/>
-              <a:t>31</a:t>
+              <a:t>32</a:t>
             </a:fld>
             <a:endParaRPr lang="zh-CN" altLang="en-US"/>
           </a:p>
@@ -1230,7 +1232,7 @@
           <a:p>
             <a:fld id="{D0CA3166-A36D-43A3-A50C-6C4A4EA83EFC}" type="slidenum">
               <a:rPr lang="zh-CN" altLang="en-US" smtClean="0"/>
-              <a:t>32</a:t>
+              <a:t>33</a:t>
             </a:fld>
             <a:endParaRPr lang="zh-CN" altLang="en-US"/>
           </a:p>
@@ -1314,7 +1316,7 @@
           <a:p>
             <a:fld id="{D0CA3166-A36D-43A3-A50C-6C4A4EA83EFC}" type="slidenum">
               <a:rPr lang="zh-CN" altLang="en-US" smtClean="0"/>
-              <a:t>33</a:t>
+              <a:t>34</a:t>
             </a:fld>
             <a:endParaRPr lang="zh-CN" altLang="en-US"/>
           </a:p>
@@ -1405,7 +1407,7 @@
           <a:p>
             <a:fld id="{D0CA3166-A36D-43A3-A50C-6C4A4EA83EFC}" type="slidenum">
               <a:rPr lang="zh-CN" altLang="en-US" smtClean="0"/>
-              <a:t>34</a:t>
+              <a:t>36</a:t>
             </a:fld>
             <a:endParaRPr lang="zh-CN" altLang="en-US"/>
           </a:p>
@@ -1493,7 +1495,7 @@
           <a:p>
             <a:fld id="{D0CA3166-A36D-43A3-A50C-6C4A4EA83EFC}" type="slidenum">
               <a:rPr lang="zh-CN" altLang="en-US" smtClean="0"/>
-              <a:t>38</a:t>
+              <a:t>40</a:t>
             </a:fld>
             <a:endParaRPr lang="zh-CN" altLang="en-US"/>
           </a:p>
@@ -2078,7 +2080,7 @@
           <a:p>
             <a:fld id="{D0CA3166-A36D-43A3-A50C-6C4A4EA83EFC}" type="slidenum">
               <a:rPr lang="zh-CN" altLang="en-US" smtClean="0"/>
-              <a:t>12</a:t>
+              <a:t>13</a:t>
             </a:fld>
             <a:endParaRPr lang="zh-CN" altLang="en-US"/>
           </a:p>
@@ -2180,7 +2182,7 @@
           <a:p>
             <a:fld id="{D0CA3166-A36D-43A3-A50C-6C4A4EA83EFC}" type="slidenum">
               <a:rPr lang="zh-CN" altLang="en-US" smtClean="0"/>
-              <a:t>13</a:t>
+              <a:t>14</a:t>
             </a:fld>
             <a:endParaRPr lang="zh-CN" altLang="en-US"/>
           </a:p>
@@ -2274,7 +2276,7 @@
           <a:p>
             <a:fld id="{D0CA3166-A36D-43A3-A50C-6C4A4EA83EFC}" type="slidenum">
               <a:rPr lang="zh-CN" altLang="en-US" smtClean="0"/>
-              <a:t>14</a:t>
+              <a:t>15</a:t>
             </a:fld>
             <a:endParaRPr lang="zh-CN" altLang="en-US"/>
           </a:p>
@@ -2362,7 +2364,7 @@
           <a:p>
             <a:fld id="{D0CA3166-A36D-43A3-A50C-6C4A4EA83EFC}" type="slidenum">
               <a:rPr lang="zh-CN" altLang="en-US" smtClean="0"/>
-              <a:t>16</a:t>
+              <a:t>17</a:t>
             </a:fld>
             <a:endParaRPr lang="zh-CN" altLang="en-US"/>
           </a:p>
@@ -2607,7 +2609,7 @@
           <a:p>
             <a:fld id="{4BDF68E2-58F2-4D09-BE8B-E3BD06533059}" type="datetimeFigureOut">
               <a:rPr lang="en-US" dirty="0"/>
-              <a:t>3/25/2019</a:t>
+              <a:t>3/27/2019</a:t>
             </a:fld>
             <a:endParaRPr lang="en-US" dirty="0"/>
           </a:p>
@@ -2839,7 +2841,7 @@
           <a:p>
             <a:fld id="{2E2D6473-DF6D-4702-B328-E0DD40540A4E}" type="datetimeFigureOut">
               <a:rPr lang="en-US" dirty="0"/>
-              <a:t>3/25/2019</a:t>
+              <a:t>3/27/2019</a:t>
             </a:fld>
             <a:endParaRPr lang="en-US" dirty="0"/>
           </a:p>
@@ -3119,7 +3121,7 @@
           <a:p>
             <a:fld id="{E26F7E3A-B166-407D-9866-32884E7D5B37}" type="datetimeFigureOut">
               <a:rPr lang="en-US" dirty="0"/>
-              <a:t>3/25/2019</a:t>
+              <a:t>3/27/2019</a:t>
             </a:fld>
             <a:endParaRPr lang="en-US" dirty="0"/>
           </a:p>
@@ -3317,7 +3319,7 @@
           <a:p>
             <a:fld id="{528FC5F6-F338-4AE4-BB23-26385BCFC423}" type="datetimeFigureOut">
               <a:rPr lang="en-US" dirty="0"/>
-              <a:t>3/25/2019</a:t>
+              <a:t>3/27/2019</a:t>
             </a:fld>
             <a:endParaRPr lang="en-US" dirty="0"/>
           </a:p>
@@ -3684,7 +3686,7 @@
           <a:p>
             <a:fld id="{20EBB0C4-6273-4C6E-B9BD-2EDC30F1CD52}" type="datetimeFigureOut">
               <a:rPr lang="en-US" dirty="0"/>
-              <a:t>3/25/2019</a:t>
+              <a:t>3/27/2019</a:t>
             </a:fld>
             <a:endParaRPr lang="en-US" dirty="0"/>
           </a:p>
@@ -3983,7 +3985,7 @@
           <a:p>
             <a:fld id="{19AB4D41-86C1-4908-B66A-0B50CEB3BF29}" type="datetimeFigureOut">
               <a:rPr lang="en-US" dirty="0"/>
-              <a:t>3/25/2019</a:t>
+              <a:t>3/27/2019</a:t>
             </a:fld>
             <a:endParaRPr lang="en-US" dirty="0"/>
           </a:p>
@@ -4386,7 +4388,7 @@
           <a:p>
             <a:fld id="{E6426E2C-56C1-4E0D-A793-0088A7FDD37E}" type="datetimeFigureOut">
               <a:rPr lang="en-US" dirty="0"/>
-              <a:t>3/25/2019</a:t>
+              <a:t>3/27/2019</a:t>
             </a:fld>
             <a:endParaRPr lang="en-US" dirty="0"/>
           </a:p>
@@ -4528,7 +4530,7 @@
           <a:p>
             <a:fld id="{C8C39B41-D8B5-4052-B551-9B5525EAA8B6}" type="datetimeFigureOut">
               <a:rPr lang="en-US" dirty="0"/>
-              <a:t>3/25/2019</a:t>
+              <a:t>3/27/2019</a:t>
             </a:fld>
             <a:endParaRPr lang="en-US" dirty="0"/>
           </a:p>
@@ -4723,7 +4725,7 @@
           <a:p>
             <a:fld id="{4D94136C-8742-45B2-AF27-D93DF72833A9}" type="datetimeFigureOut">
               <a:rPr lang="en-US" dirty="0"/>
-              <a:t>3/25/2019</a:t>
+              <a:t>3/27/2019</a:t>
             </a:fld>
             <a:endParaRPr lang="en-US" dirty="0"/>
           </a:p>
@@ -5102,7 +5104,7 @@
           <a:p>
             <a:fld id="{32ABBEA6-7C60-4B02-AE87-00D78D8422AF}" type="datetimeFigureOut">
               <a:rPr lang="en-US" dirty="0"/>
-              <a:t>3/25/2019</a:t>
+              <a:t>3/27/2019</a:t>
             </a:fld>
             <a:endParaRPr lang="en-US" dirty="0"/>
           </a:p>
@@ -5509,7 +5511,7 @@
           <a:p>
             <a:fld id="{C9CAD897-D46E-4AD2-BD9B-49DD3E640873}" type="datetimeFigureOut">
               <a:rPr lang="en-US" dirty="0"/>
-              <a:t>3/25/2019</a:t>
+              <a:t>3/27/2019</a:t>
             </a:fld>
             <a:endParaRPr lang="en-US" dirty="0"/>
           </a:p>
@@ -5820,7 +5822,7 @@
           <a:p>
             <a:fld id="{98624D31-43A5-475A-80CF-332C9F6DCF35}" type="datetimeFigureOut">
               <a:rPr lang="en-US" dirty="0"/>
-              <a:t>3/25/2019</a:t>
+              <a:t>3/27/2019</a:t>
             </a:fld>
             <a:endParaRPr lang="en-US" dirty="0"/>
           </a:p>
@@ -6981,6 +6983,70 @@
           <a:chExt cx="0" cy="0"/>
         </a:xfrm>
       </p:grpSpPr>
+      <p:pic>
+        <p:nvPicPr>
+          <p:cNvPr id="3" name="图片 2">
+            <a:extLst>
+              <a:ext uri="{FF2B5EF4-FFF2-40B4-BE49-F238E27FC236}">
+                <a16:creationId xmlns:a16="http://schemas.microsoft.com/office/drawing/2014/main" id="{9E4DEFF1-CEC1-4D2E-88A4-B3352C9BB7E5}"/>
+              </a:ext>
+            </a:extLst>
+          </p:cNvPr>
+          <p:cNvPicPr>
+            <a:picLocks noChangeAspect="1"/>
+          </p:cNvPicPr>
+          <p:nvPr>
+            <p:custDataLst>
+              <p:tags r:id="rId1"/>
+            </p:custDataLst>
+          </p:nvPr>
+        </p:nvPicPr>
+        <p:blipFill>
+          <a:blip r:embed="rId3"/>
+          <a:stretch>
+            <a:fillRect/>
+          </a:stretch>
+        </p:blipFill>
+        <p:spPr>
+          <a:xfrm>
+            <a:off x="490509" y="2991134"/>
+            <a:ext cx="9103618" cy="720254"/>
+          </a:xfrm>
+          <a:prstGeom prst="rect">
+            <a:avLst/>
+          </a:prstGeom>
+        </p:spPr>
+      </p:pic>
+    </p:spTree>
+    <p:extLst>
+      <p:ext uri="{BB962C8B-B14F-4D97-AF65-F5344CB8AC3E}">
+        <p14:creationId xmlns:p14="http://schemas.microsoft.com/office/powerpoint/2010/main" val="1277331098"/>
+      </p:ext>
+    </p:extLst>
+  </p:cSld>
+  <p:clrMapOvr>
+    <a:masterClrMapping/>
+  </p:clrMapOvr>
+</p:sld>
+</file>
+
+<file path=ppt/slides/slide13.xml><?xml version="1.0" encoding="utf-8"?>
+<p:sld xmlns:a="http://schemas.openxmlformats.org/drawingml/2006/main" xmlns:r="http://schemas.openxmlformats.org/officeDocument/2006/relationships" xmlns:p="http://schemas.openxmlformats.org/presentationml/2006/main">
+  <p:cSld>
+    <p:spTree>
+      <p:nvGrpSpPr>
+        <p:cNvPr id="1" name=""/>
+        <p:cNvGrpSpPr/>
+        <p:nvPr/>
+      </p:nvGrpSpPr>
+      <p:grpSpPr>
+        <a:xfrm>
+          <a:off x="0" y="0"/>
+          <a:ext cx="0" cy="0"/>
+          <a:chOff x="0" y="0"/>
+          <a:chExt cx="0" cy="0"/>
+        </a:xfrm>
+      </p:grpSpPr>
       <p:sp>
         <p:nvSpPr>
           <p:cNvPr id="2" name="标题 1">
@@ -7055,7 +7121,7 @@
 </p:sld>
 </file>
 
-<file path=ppt/slides/slide13.xml><?xml version="1.0" encoding="utf-8"?>
+<file path=ppt/slides/slide14.xml><?xml version="1.0" encoding="utf-8"?>
 <p:sld xmlns:a="http://schemas.openxmlformats.org/drawingml/2006/main" xmlns:r="http://schemas.openxmlformats.org/officeDocument/2006/relationships" xmlns:p="http://schemas.openxmlformats.org/presentationml/2006/main">
   <p:cSld>
     <p:spTree>
@@ -7169,7 +7235,7 @@
 </p:sld>
 </file>
 
-<file path=ppt/slides/slide14.xml><?xml version="1.0" encoding="utf-8"?>
+<file path=ppt/slides/slide15.xml><?xml version="1.0" encoding="utf-8"?>
 <p:sld xmlns:a="http://schemas.openxmlformats.org/drawingml/2006/main" xmlns:r="http://schemas.openxmlformats.org/officeDocument/2006/relationships" xmlns:p="http://schemas.openxmlformats.org/presentationml/2006/main">
   <p:cSld>
     <p:spTree>
@@ -7286,7 +7352,7 @@
 </p:sld>
 </file>
 
-<file path=ppt/slides/slide15.xml><?xml version="1.0" encoding="utf-8"?>
+<file path=ppt/slides/slide16.xml><?xml version="1.0" encoding="utf-8"?>
 <p:sld xmlns:a="http://schemas.openxmlformats.org/drawingml/2006/main" xmlns:r="http://schemas.openxmlformats.org/officeDocument/2006/relationships" xmlns:p="http://schemas.openxmlformats.org/presentationml/2006/main">
   <p:cSld>
     <p:spTree>
@@ -7406,110 +7472,6 @@
 </p:sld>
 </file>
 
-<file path=ppt/slides/slide16.xml><?xml version="1.0" encoding="utf-8"?>
-<p:sld xmlns:a="http://schemas.openxmlformats.org/drawingml/2006/main" xmlns:r="http://schemas.openxmlformats.org/officeDocument/2006/relationships" xmlns:p="http://schemas.openxmlformats.org/presentationml/2006/main">
-  <p:cSld>
-    <p:spTree>
-      <p:nvGrpSpPr>
-        <p:cNvPr id="1" name=""/>
-        <p:cNvGrpSpPr/>
-        <p:nvPr/>
-      </p:nvGrpSpPr>
-      <p:grpSpPr>
-        <a:xfrm>
-          <a:off x="0" y="0"/>
-          <a:ext cx="0" cy="0"/>
-          <a:chOff x="0" y="0"/>
-          <a:chExt cx="0" cy="0"/>
-        </a:xfrm>
-      </p:grpSpPr>
-      <p:sp>
-        <p:nvSpPr>
-          <p:cNvPr id="2" name="标题 1">
-            <a:extLst>
-              <a:ext uri="{FF2B5EF4-FFF2-40B4-BE49-F238E27FC236}">
-                <a16:creationId xmlns:a16="http://schemas.microsoft.com/office/drawing/2014/main" id="{9C3D5125-8964-4107-B173-0B3B7FDA4771}"/>
-              </a:ext>
-            </a:extLst>
-          </p:cNvPr>
-          <p:cNvSpPr>
-            <a:spLocks noGrp="1"/>
-          </p:cNvSpPr>
-          <p:nvPr>
-            <p:ph type="title"/>
-          </p:nvPr>
-        </p:nvSpPr>
-        <p:spPr/>
-        <p:txBody>
-          <a:bodyPr/>
-          <a:lstStyle/>
-          <a:p>
-            <a:r>
-              <a:rPr lang="en-US" altLang="zh-CN" dirty="0"/>
-              <a:t>Comments: %</a:t>
-            </a:r>
-            <a:endParaRPr lang="zh-CN" altLang="en-US" dirty="0"/>
-          </a:p>
-        </p:txBody>
-      </p:sp>
-      <p:sp>
-        <p:nvSpPr>
-          <p:cNvPr id="3" name="内容占位符 2">
-            <a:extLst>
-              <a:ext uri="{FF2B5EF4-FFF2-40B4-BE49-F238E27FC236}">
-                <a16:creationId xmlns:a16="http://schemas.microsoft.com/office/drawing/2014/main" id="{556B3C94-A24A-46CF-BE65-746C372A31D0}"/>
-              </a:ext>
-            </a:extLst>
-          </p:cNvPr>
-          <p:cNvSpPr>
-            <a:spLocks noGrp="1"/>
-          </p:cNvSpPr>
-          <p:nvPr>
-            <p:ph idx="1"/>
-          </p:nvPr>
-        </p:nvSpPr>
-        <p:spPr/>
-        <p:txBody>
-          <a:bodyPr>
-            <a:normAutofit/>
-          </a:bodyPr>
-          <a:lstStyle/>
-          <a:p>
-            <a:r>
-              <a:rPr lang="en-GB" altLang="zh-CN" sz="3600" dirty="0"/>
-              <a:t>it ignores the rest of the present line, </a:t>
-            </a:r>
-            <a:br>
-              <a:rPr lang="en-GB" altLang="zh-CN" sz="3600" dirty="0"/>
-            </a:br>
-            <a:r>
-              <a:rPr lang="en-GB" altLang="zh-CN" sz="3600" dirty="0"/>
-              <a:t>the line break, </a:t>
-            </a:r>
-            <a:br>
-              <a:rPr lang="en-GB" altLang="zh-CN" sz="3600" dirty="0"/>
-            </a:br>
-            <a:r>
-              <a:rPr lang="en-GB" altLang="zh-CN" sz="3600" dirty="0"/>
-              <a:t>and all whitespace at the beginning of the next line.</a:t>
-            </a:r>
-            <a:endParaRPr lang="zh-CN" altLang="en-US" sz="3600" dirty="0"/>
-          </a:p>
-        </p:txBody>
-      </p:sp>
-    </p:spTree>
-    <p:extLst>
-      <p:ext uri="{BB962C8B-B14F-4D97-AF65-F5344CB8AC3E}">
-        <p14:creationId xmlns:p14="http://schemas.microsoft.com/office/powerpoint/2010/main" val="2566866681"/>
-      </p:ext>
-    </p:extLst>
-  </p:cSld>
-  <p:clrMapOvr>
-    <a:masterClrMapping/>
-  </p:clrMapOvr>
-</p:sld>
-</file>
-
 <file path=ppt/slides/slide17.xml><?xml version="1.0" encoding="utf-8"?>
 <p:sld xmlns:a="http://schemas.openxmlformats.org/drawingml/2006/main" xmlns:r="http://schemas.openxmlformats.org/officeDocument/2006/relationships" xmlns:p="http://schemas.openxmlformats.org/presentationml/2006/main">
   <p:cSld>
@@ -7532,7 +7494,7 @@
           <p:cNvPr id="2" name="标题 1">
             <a:extLst>
               <a:ext uri="{FF2B5EF4-FFF2-40B4-BE49-F238E27FC236}">
-                <a16:creationId xmlns:a16="http://schemas.microsoft.com/office/drawing/2014/main" id="{0E93535A-A852-4400-893D-97E61F044D83}"/>
+                <a16:creationId xmlns:a16="http://schemas.microsoft.com/office/drawing/2014/main" id="{9C3D5125-8964-4107-B173-0B3B7FDA4771}"/>
               </a:ext>
             </a:extLst>
           </p:cNvPr>
@@ -7550,7 +7512,7 @@
           <a:p>
             <a:r>
               <a:rPr lang="en-US" altLang="zh-CN" dirty="0"/>
-              <a:t>Input File Structure</a:t>
+              <a:t>Comments: %</a:t>
             </a:r>
             <a:endParaRPr lang="zh-CN" altLang="en-US" dirty="0"/>
           </a:p>
@@ -7558,10 +7520,10 @@
       </p:sp>
       <p:sp>
         <p:nvSpPr>
-          <p:cNvPr id="3" name="文本占位符 2">
+          <p:cNvPr id="3" name="内容占位符 2">
             <a:extLst>
               <a:ext uri="{FF2B5EF4-FFF2-40B4-BE49-F238E27FC236}">
-                <a16:creationId xmlns:a16="http://schemas.microsoft.com/office/drawing/2014/main" id="{1E98514E-A71A-4C53-8C7C-EF503AD3E78B}"/>
+                <a16:creationId xmlns:a16="http://schemas.microsoft.com/office/drawing/2014/main" id="{556B3C94-A24A-46CF-BE65-746C372A31D0}"/>
               </a:ext>
             </a:extLst>
           </p:cNvPr>
@@ -7569,22 +7531,42 @@
             <a:spLocks noGrp="1"/>
           </p:cNvSpPr>
           <p:nvPr>
-            <p:ph type="body" idx="1"/>
-          </p:nvPr>
-        </p:nvSpPr>
-        <p:spPr/>
-        <p:txBody>
-          <a:bodyPr/>
-          <a:lstStyle/>
-          <a:p>
-            <a:endParaRPr lang="zh-CN" altLang="en-US"/>
+            <p:ph idx="1"/>
+          </p:nvPr>
+        </p:nvSpPr>
+        <p:spPr/>
+        <p:txBody>
+          <a:bodyPr>
+            <a:normAutofit/>
+          </a:bodyPr>
+          <a:lstStyle/>
+          <a:p>
+            <a:r>
+              <a:rPr lang="en-GB" altLang="zh-CN" sz="3600" dirty="0"/>
+              <a:t>it ignores the rest of the present line, </a:t>
+            </a:r>
+            <a:br>
+              <a:rPr lang="en-GB" altLang="zh-CN" sz="3600" dirty="0"/>
+            </a:br>
+            <a:r>
+              <a:rPr lang="en-GB" altLang="zh-CN" sz="3600" dirty="0"/>
+              <a:t>the line break, </a:t>
+            </a:r>
+            <a:br>
+              <a:rPr lang="en-GB" altLang="zh-CN" sz="3600" dirty="0"/>
+            </a:br>
+            <a:r>
+              <a:rPr lang="en-GB" altLang="zh-CN" sz="3600" dirty="0"/>
+              <a:t>and all whitespace at the beginning of the next line.</a:t>
+            </a:r>
+            <a:endParaRPr lang="zh-CN" altLang="en-US" sz="3600" dirty="0"/>
           </a:p>
         </p:txBody>
       </p:sp>
     </p:spTree>
     <p:extLst>
       <p:ext uri="{BB962C8B-B14F-4D97-AF65-F5344CB8AC3E}">
-        <p14:creationId xmlns:p14="http://schemas.microsoft.com/office/powerpoint/2010/main" val="1690489085"/>
+        <p14:creationId xmlns:p14="http://schemas.microsoft.com/office/powerpoint/2010/main" val="2566866681"/>
       </p:ext>
     </p:extLst>
   </p:cSld>
@@ -7616,7 +7598,7 @@
           <p:cNvPr id="2" name="标题 1">
             <a:extLst>
               <a:ext uri="{FF2B5EF4-FFF2-40B4-BE49-F238E27FC236}">
-                <a16:creationId xmlns:a16="http://schemas.microsoft.com/office/drawing/2014/main" id="{73AD5919-7DB8-4CE4-8C7E-8DFF4E11CEDA}"/>
+                <a16:creationId xmlns:a16="http://schemas.microsoft.com/office/drawing/2014/main" id="{0E93535A-A852-4400-893D-97E61F044D83}"/>
               </a:ext>
             </a:extLst>
           </p:cNvPr>
@@ -7632,16 +7614,20 @@
           <a:bodyPr/>
           <a:lstStyle/>
           <a:p>
-            <a:endParaRPr lang="zh-CN" altLang="en-US"/>
-          </a:p>
-        </p:txBody>
-      </p:sp>
-      <p:sp>
-        <p:nvSpPr>
-          <p:cNvPr id="3" name="内容占位符 2">
+            <a:r>
+              <a:rPr lang="en-US" altLang="zh-CN" dirty="0"/>
+              <a:t>Input File Structure</a:t>
+            </a:r>
+            <a:endParaRPr lang="zh-CN" altLang="en-US" dirty="0"/>
+          </a:p>
+        </p:txBody>
+      </p:sp>
+      <p:sp>
+        <p:nvSpPr>
+          <p:cNvPr id="3" name="文本占位符 2">
             <a:extLst>
               <a:ext uri="{FF2B5EF4-FFF2-40B4-BE49-F238E27FC236}">
-                <a16:creationId xmlns:a16="http://schemas.microsoft.com/office/drawing/2014/main" id="{BB9A016B-B32C-462F-ADC6-C6D70E489BD1}"/>
+                <a16:creationId xmlns:a16="http://schemas.microsoft.com/office/drawing/2014/main" id="{1E98514E-A71A-4C53-8C7C-EF503AD3E78B}"/>
               </a:ext>
             </a:extLst>
           </p:cNvPr>
@@ -7649,85 +7635,22 @@
             <a:spLocks noGrp="1"/>
           </p:cNvSpPr>
           <p:nvPr>
-            <p:ph idx="1"/>
-          </p:nvPr>
-        </p:nvSpPr>
-        <p:spPr/>
-        <p:txBody>
-          <a:bodyPr>
-            <a:normAutofit fontScale="92500" lnSpcReduction="20000"/>
-          </a:bodyPr>
-          <a:lstStyle/>
-          <a:p>
-            <a:r>
-              <a:rPr lang="en-GB" altLang="zh-CN" sz="3200" b="1" i="1" dirty="0"/>
-              <a:t>\</a:t>
-            </a:r>
-            <a:r>
-              <a:rPr lang="en-GB" altLang="zh-CN" sz="3200" b="1" i="1" dirty="0" err="1"/>
-              <a:t>documentclass</a:t>
-            </a:r>
-            <a:r>
-              <a:rPr lang="en-GB" altLang="zh-CN" sz="3200" b="1" i="1" dirty="0"/>
-              <a:t>{...}: </a:t>
-            </a:r>
-            <a:br>
-              <a:rPr lang="en-GB" altLang="zh-CN" sz="3200" dirty="0"/>
-            </a:br>
-            <a:r>
-              <a:rPr lang="en-GB" altLang="zh-CN" sz="3200" dirty="0"/>
-              <a:t>This specifies what sort of document you intend to write</a:t>
-            </a:r>
-          </a:p>
-          <a:p>
-            <a:r>
-              <a:rPr lang="en-GB" altLang="zh-CN" sz="3200" b="1" i="1" dirty="0"/>
-              <a:t>\</a:t>
-            </a:r>
-            <a:r>
-              <a:rPr lang="en-GB" altLang="zh-CN" sz="3200" b="1" i="1" dirty="0" err="1"/>
-              <a:t>usepackage</a:t>
-            </a:r>
-            <a:r>
-              <a:rPr lang="en-GB" altLang="zh-CN" sz="3200" b="1" i="1" dirty="0"/>
-              <a:t>{...}</a:t>
-            </a:r>
-            <a:br>
-              <a:rPr lang="en-GB" altLang="zh-CN" sz="3200" dirty="0"/>
-            </a:br>
-            <a:r>
-              <a:rPr lang="en-GB" altLang="zh-CN" sz="3200" dirty="0"/>
-              <a:t>commands to influence the style of the whole document, or load packages</a:t>
-            </a:r>
-          </a:p>
-          <a:p>
-            <a:endParaRPr lang="en-GB" altLang="zh-CN" sz="3200" dirty="0"/>
-          </a:p>
-          <a:p>
-            <a:r>
-              <a:rPr lang="en-GB" altLang="zh-CN" sz="3200" b="1" i="1" dirty="0"/>
-              <a:t>\begin{document}</a:t>
-            </a:r>
-          </a:p>
-          <a:p>
-            <a:r>
-              <a:rPr lang="en-GB" altLang="zh-CN" sz="3200" b="1" i="1" dirty="0"/>
-              <a:t>…</a:t>
-            </a:r>
-          </a:p>
-          <a:p>
-            <a:r>
-              <a:rPr lang="en-GB" altLang="zh-CN" sz="3200" b="1" i="1" dirty="0"/>
-              <a:t>\end{document}</a:t>
-            </a:r>
-            <a:endParaRPr lang="zh-CN" altLang="en-US" sz="3200" b="1" i="1" dirty="0"/>
+            <p:ph type="body" idx="1"/>
+          </p:nvPr>
+        </p:nvSpPr>
+        <p:spPr/>
+        <p:txBody>
+          <a:bodyPr/>
+          <a:lstStyle/>
+          <a:p>
+            <a:endParaRPr lang="zh-CN" altLang="en-US"/>
           </a:p>
         </p:txBody>
       </p:sp>
     </p:spTree>
     <p:extLst>
       <p:ext uri="{BB962C8B-B14F-4D97-AF65-F5344CB8AC3E}">
-        <p14:creationId xmlns:p14="http://schemas.microsoft.com/office/powerpoint/2010/main" val="3619729952"/>
+        <p14:creationId xmlns:p14="http://schemas.microsoft.com/office/powerpoint/2010/main" val="1690489085"/>
       </p:ext>
     </p:extLst>
   </p:cSld>
@@ -7759,7 +7682,7 @@
           <p:cNvPr id="2" name="标题 1">
             <a:extLst>
               <a:ext uri="{FF2B5EF4-FFF2-40B4-BE49-F238E27FC236}">
-                <a16:creationId xmlns:a16="http://schemas.microsoft.com/office/drawing/2014/main" id="{8323A7DB-6E4E-4CB6-8AE3-B3FF25154FA6}"/>
+                <a16:creationId xmlns:a16="http://schemas.microsoft.com/office/drawing/2014/main" id="{73AD5919-7DB8-4CE4-8C7E-8DFF4E11CEDA}"/>
               </a:ext>
             </a:extLst>
           </p:cNvPr>
@@ -7775,11 +7698,7 @@
           <a:bodyPr/>
           <a:lstStyle/>
           <a:p>
-            <a:r>
-              <a:rPr lang="en-US" altLang="zh-CN" dirty="0"/>
-              <a:t>Files You Might Encounter</a:t>
-            </a:r>
-            <a:endParaRPr lang="zh-CN" altLang="en-US" dirty="0"/>
+            <a:endParaRPr lang="zh-CN" altLang="en-US"/>
           </a:p>
         </p:txBody>
       </p:sp>
@@ -7788,7 +7707,7 @@
           <p:cNvPr id="3" name="内容占位符 2">
             <a:extLst>
               <a:ext uri="{FF2B5EF4-FFF2-40B4-BE49-F238E27FC236}">
-                <a16:creationId xmlns:a16="http://schemas.microsoft.com/office/drawing/2014/main" id="{CF1421B1-E2C0-4FB2-8966-E024C8DA48B9}"/>
+                <a16:creationId xmlns:a16="http://schemas.microsoft.com/office/drawing/2014/main" id="{BB9A016B-B32C-462F-ADC6-C6D70E489BD1}"/>
               </a:ext>
             </a:extLst>
           </p:cNvPr>
@@ -7802,21 +7721,49 @@
         <p:spPr/>
         <p:txBody>
           <a:bodyPr>
-            <a:normAutofit/>
+            <a:normAutofit fontScale="92500" lnSpcReduction="20000"/>
           </a:bodyPr>
           <a:lstStyle/>
           <a:p>
             <a:r>
+              <a:rPr lang="en-GB" altLang="zh-CN" sz="3200" b="1" i="1" dirty="0"/>
+              <a:t>\</a:t>
+            </a:r>
+            <a:r>
+              <a:rPr lang="en-GB" altLang="zh-CN" sz="3200" b="1" i="1" dirty="0" err="1"/>
+              <a:t>documentclass</a:t>
+            </a:r>
+            <a:r>
+              <a:rPr lang="en-GB" altLang="zh-CN" sz="3200" b="1" i="1" dirty="0"/>
+              <a:t>{...}: </a:t>
+            </a:r>
+            <a:br>
               <a:rPr lang="en-GB" altLang="zh-CN" sz="3200" dirty="0"/>
-              <a:t>.</a:t>
-            </a:r>
-            <a:r>
-              <a:rPr lang="en-GB" altLang="zh-CN" sz="3200" dirty="0" err="1"/>
-              <a:t>tex</a:t>
-            </a:r>
+            </a:br>
             <a:r>
               <a:rPr lang="en-GB" altLang="zh-CN" sz="3200" dirty="0"/>
-              <a:t>  LATEX or TEX input file. Can be compiled with latex.</a:t>
+              <a:t>This specifies what sort of document you intend to write</a:t>
+            </a:r>
+          </a:p>
+          <a:p>
+            <a:r>
+              <a:rPr lang="en-GB" altLang="zh-CN" sz="3200" b="1" i="1" dirty="0"/>
+              <a:t>\</a:t>
+            </a:r>
+            <a:r>
+              <a:rPr lang="en-GB" altLang="zh-CN" sz="3200" b="1" i="1" dirty="0" err="1"/>
+              <a:t>usepackage</a:t>
+            </a:r>
+            <a:r>
+              <a:rPr lang="en-GB" altLang="zh-CN" sz="3200" b="1" i="1" dirty="0"/>
+              <a:t>{...}</a:t>
+            </a:r>
+            <a:br>
+              <a:rPr lang="en-GB" altLang="zh-CN" sz="3200" dirty="0"/>
+            </a:br>
+            <a:r>
+              <a:rPr lang="en-GB" altLang="zh-CN" sz="3200" dirty="0"/>
+              <a:t>commands to influence the style of the whole document, or load packages</a:t>
             </a:r>
           </a:p>
           <a:p>
@@ -7824,25 +7771,29 @@
           </a:p>
           <a:p>
             <a:r>
-              <a:rPr lang="en-GB" altLang="zh-CN" sz="3200" dirty="0"/>
-              <a:t>.sty LATEX Macro package. Load this into your LATEX document using the \</a:t>
-            </a:r>
-            <a:r>
-              <a:rPr lang="en-GB" altLang="zh-CN" sz="3200" dirty="0" err="1"/>
-              <a:t>usepackage</a:t>
-            </a:r>
-            <a:r>
-              <a:rPr lang="en-GB" altLang="zh-CN" sz="3200" dirty="0"/>
-              <a:t> command.</a:t>
-            </a:r>
-            <a:endParaRPr lang="zh-CN" altLang="en-US" sz="3200" dirty="0"/>
+              <a:rPr lang="en-GB" altLang="zh-CN" sz="3200" b="1" i="1" dirty="0"/>
+              <a:t>\begin{document}</a:t>
+            </a:r>
+          </a:p>
+          <a:p>
+            <a:r>
+              <a:rPr lang="en-GB" altLang="zh-CN" sz="3200" b="1" i="1" dirty="0"/>
+              <a:t>…</a:t>
+            </a:r>
+          </a:p>
+          <a:p>
+            <a:r>
+              <a:rPr lang="en-GB" altLang="zh-CN" sz="3200" b="1" i="1" dirty="0"/>
+              <a:t>\end{document}</a:t>
+            </a:r>
+            <a:endParaRPr lang="zh-CN" altLang="en-US" sz="3200" b="1" i="1" dirty="0"/>
           </a:p>
         </p:txBody>
       </p:sp>
     </p:spTree>
     <p:extLst>
       <p:ext uri="{BB962C8B-B14F-4D97-AF65-F5344CB8AC3E}">
-        <p14:creationId xmlns:p14="http://schemas.microsoft.com/office/powerpoint/2010/main" val="3302138169"/>
+        <p14:creationId xmlns:p14="http://schemas.microsoft.com/office/powerpoint/2010/main" val="3619729952"/>
       </p:ext>
     </p:extLst>
   </p:cSld>
@@ -9412,6 +9363,121 @@
           <p:cNvPr id="2" name="标题 1">
             <a:extLst>
               <a:ext uri="{FF2B5EF4-FFF2-40B4-BE49-F238E27FC236}">
+                <a16:creationId xmlns:a16="http://schemas.microsoft.com/office/drawing/2014/main" id="{8323A7DB-6E4E-4CB6-8AE3-B3FF25154FA6}"/>
+              </a:ext>
+            </a:extLst>
+          </p:cNvPr>
+          <p:cNvSpPr>
+            <a:spLocks noGrp="1"/>
+          </p:cNvSpPr>
+          <p:nvPr>
+            <p:ph type="title"/>
+          </p:nvPr>
+        </p:nvSpPr>
+        <p:spPr/>
+        <p:txBody>
+          <a:bodyPr/>
+          <a:lstStyle/>
+          <a:p>
+            <a:r>
+              <a:rPr lang="en-US" altLang="zh-CN" dirty="0"/>
+              <a:t>Files You Might Encounter</a:t>
+            </a:r>
+            <a:endParaRPr lang="zh-CN" altLang="en-US" dirty="0"/>
+          </a:p>
+        </p:txBody>
+      </p:sp>
+      <p:sp>
+        <p:nvSpPr>
+          <p:cNvPr id="3" name="内容占位符 2">
+            <a:extLst>
+              <a:ext uri="{FF2B5EF4-FFF2-40B4-BE49-F238E27FC236}">
+                <a16:creationId xmlns:a16="http://schemas.microsoft.com/office/drawing/2014/main" id="{CF1421B1-E2C0-4FB2-8966-E024C8DA48B9}"/>
+              </a:ext>
+            </a:extLst>
+          </p:cNvPr>
+          <p:cNvSpPr>
+            <a:spLocks noGrp="1"/>
+          </p:cNvSpPr>
+          <p:nvPr>
+            <p:ph idx="1"/>
+          </p:nvPr>
+        </p:nvSpPr>
+        <p:spPr/>
+        <p:txBody>
+          <a:bodyPr>
+            <a:normAutofit/>
+          </a:bodyPr>
+          <a:lstStyle/>
+          <a:p>
+            <a:r>
+              <a:rPr lang="en-GB" altLang="zh-CN" sz="3200" dirty="0"/>
+              <a:t>.</a:t>
+            </a:r>
+            <a:r>
+              <a:rPr lang="en-GB" altLang="zh-CN" sz="3200" dirty="0" err="1"/>
+              <a:t>tex</a:t>
+            </a:r>
+            <a:r>
+              <a:rPr lang="en-GB" altLang="zh-CN" sz="3200" dirty="0"/>
+              <a:t>  LATEX or TEX input file. Can be compiled with latex.</a:t>
+            </a:r>
+          </a:p>
+          <a:p>
+            <a:endParaRPr lang="en-GB" altLang="zh-CN" sz="3200" dirty="0"/>
+          </a:p>
+          <a:p>
+            <a:r>
+              <a:rPr lang="en-GB" altLang="zh-CN" sz="3200" dirty="0"/>
+              <a:t>.sty LATEX Macro package. Load this into your LATEX document using the \</a:t>
+            </a:r>
+            <a:r>
+              <a:rPr lang="en-GB" altLang="zh-CN" sz="3200" dirty="0" err="1"/>
+              <a:t>usepackage</a:t>
+            </a:r>
+            <a:r>
+              <a:rPr lang="en-GB" altLang="zh-CN" sz="3200" dirty="0"/>
+              <a:t> command.</a:t>
+            </a:r>
+            <a:endParaRPr lang="zh-CN" altLang="en-US" sz="3200" dirty="0"/>
+          </a:p>
+        </p:txBody>
+      </p:sp>
+    </p:spTree>
+    <p:extLst>
+      <p:ext uri="{BB962C8B-B14F-4D97-AF65-F5344CB8AC3E}">
+        <p14:creationId xmlns:p14="http://schemas.microsoft.com/office/powerpoint/2010/main" val="3302138169"/>
+      </p:ext>
+    </p:extLst>
+  </p:cSld>
+  <p:clrMapOvr>
+    <a:masterClrMapping/>
+  </p:clrMapOvr>
+</p:sld>
+</file>
+
+<file path=ppt/slides/slide21.xml><?xml version="1.0" encoding="utf-8"?>
+<p:sld xmlns:a="http://schemas.openxmlformats.org/drawingml/2006/main" xmlns:r="http://schemas.openxmlformats.org/officeDocument/2006/relationships" xmlns:p="http://schemas.openxmlformats.org/presentationml/2006/main">
+  <p:cSld>
+    <p:spTree>
+      <p:nvGrpSpPr>
+        <p:cNvPr id="1" name=""/>
+        <p:cNvGrpSpPr/>
+        <p:nvPr/>
+      </p:nvGrpSpPr>
+      <p:grpSpPr>
+        <a:xfrm>
+          <a:off x="0" y="0"/>
+          <a:ext cx="0" cy="0"/>
+          <a:chOff x="0" y="0"/>
+          <a:chExt cx="0" cy="0"/>
+        </a:xfrm>
+      </p:grpSpPr>
+      <p:sp>
+        <p:nvSpPr>
+          <p:cNvPr id="2" name="标题 1">
+            <a:extLst>
+              <a:ext uri="{FF2B5EF4-FFF2-40B4-BE49-F238E27FC236}">
                 <a16:creationId xmlns:a16="http://schemas.microsoft.com/office/drawing/2014/main" id="{2C66AE8B-6C52-4F2C-AEAA-339B7A56AC67}"/>
               </a:ext>
             </a:extLst>
@@ -9511,7 +9577,7 @@
 </p:sld>
 </file>
 
-<file path=ppt/slides/slide21.xml><?xml version="1.0" encoding="utf-8"?>
+<file path=ppt/slides/slide22.xml><?xml version="1.0" encoding="utf-8"?>
 <p:sld xmlns:a="http://schemas.openxmlformats.org/drawingml/2006/main" xmlns:r="http://schemas.openxmlformats.org/officeDocument/2006/relationships" xmlns:p="http://schemas.openxmlformats.org/presentationml/2006/main">
   <p:cSld>
     <p:spTree>
@@ -9595,7 +9661,7 @@
 </p:sld>
 </file>
 
-<file path=ppt/slides/slide22.xml><?xml version="1.0" encoding="utf-8"?>
+<file path=ppt/slides/slide23.xml><?xml version="1.0" encoding="utf-8"?>
 <p:sld xmlns:a="http://schemas.openxmlformats.org/drawingml/2006/main" xmlns:r="http://schemas.openxmlformats.org/officeDocument/2006/relationships" xmlns:p="http://schemas.openxmlformats.org/presentationml/2006/main">
   <p:cSld>
     <p:spTree>
@@ -9733,7 +9799,7 @@
 </p:sld>
 </file>
 
-<file path=ppt/slides/slide23.xml><?xml version="1.0" encoding="utf-8"?>
+<file path=ppt/slides/slide24.xml><?xml version="1.0" encoding="utf-8"?>
 <p:sld xmlns:a="http://schemas.openxmlformats.org/drawingml/2006/main" xmlns:r="http://schemas.openxmlformats.org/officeDocument/2006/relationships" xmlns:p="http://schemas.openxmlformats.org/presentationml/2006/main">
   <p:cSld>
     <p:spTree>
@@ -9844,7 +9910,7 @@
           <p:nvPr>
             <p:extLst>
               <p:ext uri="{D42A27DB-BD31-4B8C-83A1-F6EECF244321}">
-                <p14:modId xmlns:p14="http://schemas.microsoft.com/office/powerpoint/2010/main" val="1087908641"/>
+                <p14:modId xmlns:p14="http://schemas.microsoft.com/office/powerpoint/2010/main" val="4215173647"/>
               </p:ext>
             </p:extLst>
           </p:nvPr>
@@ -9857,7 +9923,7 @@
           <a:graphicData uri="http://schemas.openxmlformats.org/presentationml/2006/ole">
             <mc:AlternateContent xmlns:mc="http://schemas.openxmlformats.org/markup-compatibility/2006">
               <mc:Choice xmlns:v="urn:schemas-microsoft-com:vml" Requires="v">
-                <p:oleObj spid="_x0000_s1028" name="包装程序外壳对象" showAsIcon="1" r:id="rId3" imgW="677880" imgH="324720" progId="Package">
+                <p:oleObj spid="_x0000_s1032" name="包装程序外壳对象" showAsIcon="1" r:id="rId3" imgW="677880" imgH="324720" progId="Package">
                   <p:embed/>
                 </p:oleObj>
               </mc:Choice>
@@ -9905,7 +9971,7 @@
 </p:sld>
 </file>
 
-<file path=ppt/slides/slide24.xml><?xml version="1.0" encoding="utf-8"?>
+<file path=ppt/slides/slide25.xml><?xml version="1.0" encoding="utf-8"?>
 <p:sld xmlns:a="http://schemas.openxmlformats.org/drawingml/2006/main" xmlns:r="http://schemas.openxmlformats.org/officeDocument/2006/relationships" xmlns:p="http://schemas.openxmlformats.org/presentationml/2006/main">
   <p:cSld>
     <p:spTree>
@@ -10030,7 +10096,7 @@
 </p:sld>
 </file>
 
-<file path=ppt/slides/slide25.xml><?xml version="1.0" encoding="utf-8"?>
+<file path=ppt/slides/slide26.xml><?xml version="1.0" encoding="utf-8"?>
 <p:sld xmlns:a="http://schemas.openxmlformats.org/drawingml/2006/main" xmlns:r="http://schemas.openxmlformats.org/officeDocument/2006/relationships" xmlns:p="http://schemas.openxmlformats.org/presentationml/2006/main">
   <p:cSld>
     <p:spTree>
@@ -10151,7 +10217,7 @@
 </p:sld>
 </file>
 
-<file path=ppt/slides/slide26.xml><?xml version="1.0" encoding="utf-8"?>
+<file path=ppt/slides/slide27.xml><?xml version="1.0" encoding="utf-8"?>
 <p:sld xmlns:a="http://schemas.openxmlformats.org/drawingml/2006/main" xmlns:r="http://schemas.openxmlformats.org/officeDocument/2006/relationships" xmlns:p="http://schemas.openxmlformats.org/presentationml/2006/main">
   <p:cSld>
     <p:spTree>
@@ -10272,7 +10338,7 @@
 </p:sld>
 </file>
 
-<file path=ppt/slides/slide27.xml><?xml version="1.0" encoding="utf-8"?>
+<file path=ppt/slides/slide28.xml><?xml version="1.0" encoding="utf-8"?>
 <p:sld xmlns:a="http://schemas.openxmlformats.org/drawingml/2006/main" xmlns:r="http://schemas.openxmlformats.org/officeDocument/2006/relationships" xmlns:p="http://schemas.openxmlformats.org/presentationml/2006/main">
   <p:cSld>
     <p:spTree>
@@ -10400,7 +10466,7 @@
 </p:sld>
 </file>
 
-<file path=ppt/slides/slide28.xml><?xml version="1.0" encoding="utf-8"?>
+<file path=ppt/slides/slide29.xml><?xml version="1.0" encoding="utf-8"?>
 <p:sld xmlns:a="http://schemas.openxmlformats.org/drawingml/2006/main" xmlns:r="http://schemas.openxmlformats.org/officeDocument/2006/relationships" xmlns:p="http://schemas.openxmlformats.org/presentationml/2006/main">
   <p:cSld>
     <p:spTree>
@@ -10521,7 +10587,147 @@
 </p:sld>
 </file>
 
-<file path=ppt/slides/slide29.xml><?xml version="1.0" encoding="utf-8"?>
+<file path=ppt/slides/slide3.xml><?xml version="1.0" encoding="utf-8"?>
+<p:sld xmlns:a="http://schemas.openxmlformats.org/drawingml/2006/main" xmlns:r="http://schemas.openxmlformats.org/officeDocument/2006/relationships" xmlns:p="http://schemas.openxmlformats.org/presentationml/2006/main">
+  <p:cSld>
+    <p:spTree>
+      <p:nvGrpSpPr>
+        <p:cNvPr id="1" name=""/>
+        <p:cNvGrpSpPr/>
+        <p:nvPr/>
+      </p:nvGrpSpPr>
+      <p:grpSpPr>
+        <a:xfrm>
+          <a:off x="0" y="0"/>
+          <a:ext cx="0" cy="0"/>
+          <a:chOff x="0" y="0"/>
+          <a:chExt cx="0" cy="0"/>
+        </a:xfrm>
+      </p:grpSpPr>
+      <p:sp>
+        <p:nvSpPr>
+          <p:cNvPr id="2" name="标题 1">
+            <a:extLst>
+              <a:ext uri="{FF2B5EF4-FFF2-40B4-BE49-F238E27FC236}">
+                <a16:creationId xmlns:a16="http://schemas.microsoft.com/office/drawing/2014/main" id="{83F2E84D-CEE3-45B9-8A3B-4598AD42E828}"/>
+              </a:ext>
+            </a:extLst>
+          </p:cNvPr>
+          <p:cNvSpPr>
+            <a:spLocks noGrp="1"/>
+          </p:cNvSpPr>
+          <p:nvPr>
+            <p:ph type="title"/>
+          </p:nvPr>
+        </p:nvSpPr>
+        <p:spPr/>
+        <p:txBody>
+          <a:bodyPr/>
+          <a:lstStyle/>
+          <a:p>
+            <a:r>
+              <a:rPr lang="en-US" altLang="zh-CN" dirty="0"/>
+              <a:t>Today’s agenda: Latex Tutorial</a:t>
+            </a:r>
+            <a:endParaRPr lang="zh-CN" altLang="en-US" dirty="0"/>
+          </a:p>
+        </p:txBody>
+      </p:sp>
+      <p:sp>
+        <p:nvSpPr>
+          <p:cNvPr id="7" name="内容占位符 6">
+            <a:extLst>
+              <a:ext uri="{FF2B5EF4-FFF2-40B4-BE49-F238E27FC236}">
+                <a16:creationId xmlns:a16="http://schemas.microsoft.com/office/drawing/2014/main" id="{BC8307D7-E7B8-4C0C-AF79-988E89063675}"/>
+              </a:ext>
+            </a:extLst>
+          </p:cNvPr>
+          <p:cNvSpPr>
+            <a:spLocks noGrp="1"/>
+          </p:cNvSpPr>
+          <p:nvPr>
+            <p:ph idx="1"/>
+          </p:nvPr>
+        </p:nvSpPr>
+        <p:spPr/>
+        <p:txBody>
+          <a:bodyPr>
+            <a:normAutofit/>
+          </a:bodyPr>
+          <a:lstStyle/>
+          <a:p>
+            <a:pPr>
+              <a:buFont typeface="Wingdings" panose="05000000000000000000" pitchFamily="2" charset="2"/>
+              <a:buChar char="l"/>
+            </a:pPr>
+            <a:endParaRPr lang="en-US" altLang="zh-CN" sz="3200" dirty="0"/>
+          </a:p>
+          <a:p>
+            <a:pPr>
+              <a:buFont typeface="Wingdings" panose="05000000000000000000" pitchFamily="2" charset="2"/>
+              <a:buChar char="l"/>
+            </a:pPr>
+            <a:r>
+              <a:rPr lang="en-US" altLang="zh-CN" sz="3200" dirty="0"/>
+              <a:t>History and software installation</a:t>
+            </a:r>
+          </a:p>
+          <a:p>
+            <a:pPr>
+              <a:buFont typeface="Wingdings" panose="05000000000000000000" pitchFamily="2" charset="2"/>
+              <a:buChar char="l"/>
+            </a:pPr>
+            <a:r>
+              <a:rPr lang="en-US" altLang="zh-CN" sz="3200" dirty="0"/>
+              <a:t>Input Files</a:t>
+            </a:r>
+          </a:p>
+          <a:p>
+            <a:pPr>
+              <a:buFont typeface="Wingdings" panose="05000000000000000000" pitchFamily="2" charset="2"/>
+              <a:buChar char="l"/>
+            </a:pPr>
+            <a:r>
+              <a:rPr lang="en-US" altLang="zh-CN" sz="3200" dirty="0"/>
+              <a:t>Typesetting Text</a:t>
+            </a:r>
+          </a:p>
+          <a:p>
+            <a:pPr>
+              <a:buFont typeface="Wingdings" panose="05000000000000000000" pitchFamily="2" charset="2"/>
+              <a:buChar char="l"/>
+            </a:pPr>
+            <a:r>
+              <a:rPr lang="en-US" altLang="zh-CN" sz="3200" dirty="0"/>
+              <a:t>Mathematical Formulae</a:t>
+            </a:r>
+          </a:p>
+          <a:p>
+            <a:pPr>
+              <a:buFont typeface="Wingdings" panose="05000000000000000000" pitchFamily="2" charset="2"/>
+              <a:buChar char="l"/>
+            </a:pPr>
+            <a:r>
+              <a:rPr lang="en-US" altLang="zh-CN" sz="3200" dirty="0"/>
+              <a:t>Specialties</a:t>
+            </a:r>
+          </a:p>
+        </p:txBody>
+      </p:sp>
+    </p:spTree>
+    <p:extLst>
+      <p:ext uri="{BB962C8B-B14F-4D97-AF65-F5344CB8AC3E}">
+        <p14:creationId xmlns:p14="http://schemas.microsoft.com/office/powerpoint/2010/main" val="1589704355"/>
+      </p:ext>
+    </p:extLst>
+  </p:cSld>
+  <p:clrMapOvr>
+    <a:masterClrMapping/>
+  </p:clrMapOvr>
+</p:sld>
+</file>
+
+<file path=ppt/slides/slide30.xml><?xml version="1.0" encoding="utf-8"?>
 <p:sld xmlns:a="http://schemas.openxmlformats.org/drawingml/2006/main" xmlns:r="http://schemas.openxmlformats.org/officeDocument/2006/relationships" xmlns:p="http://schemas.openxmlformats.org/presentationml/2006/main">
   <p:cSld>
     <p:spTree>
@@ -10665,7 +10871,7 @@
 </p:sld>
 </file>
 
-<file path=ppt/slides/slide3.xml><?xml version="1.0" encoding="utf-8"?>
+<file path=ppt/slides/slide31.xml><?xml version="1.0" encoding="utf-8"?>
 <p:sld xmlns:a="http://schemas.openxmlformats.org/drawingml/2006/main" xmlns:r="http://schemas.openxmlformats.org/officeDocument/2006/relationships" xmlns:p="http://schemas.openxmlformats.org/presentationml/2006/main">
   <p:cSld>
     <p:spTree>
@@ -10687,146 +10893,6 @@
           <p:cNvPr id="2" name="标题 1">
             <a:extLst>
               <a:ext uri="{FF2B5EF4-FFF2-40B4-BE49-F238E27FC236}">
-                <a16:creationId xmlns:a16="http://schemas.microsoft.com/office/drawing/2014/main" id="{83F2E84D-CEE3-45B9-8A3B-4598AD42E828}"/>
-              </a:ext>
-            </a:extLst>
-          </p:cNvPr>
-          <p:cNvSpPr>
-            <a:spLocks noGrp="1"/>
-          </p:cNvSpPr>
-          <p:nvPr>
-            <p:ph type="title"/>
-          </p:nvPr>
-        </p:nvSpPr>
-        <p:spPr/>
-        <p:txBody>
-          <a:bodyPr/>
-          <a:lstStyle/>
-          <a:p>
-            <a:r>
-              <a:rPr lang="en-US" altLang="zh-CN" dirty="0"/>
-              <a:t>Today’s agenda: Latex Tutorial</a:t>
-            </a:r>
-            <a:endParaRPr lang="zh-CN" altLang="en-US" dirty="0"/>
-          </a:p>
-        </p:txBody>
-      </p:sp>
-      <p:sp>
-        <p:nvSpPr>
-          <p:cNvPr id="7" name="内容占位符 6">
-            <a:extLst>
-              <a:ext uri="{FF2B5EF4-FFF2-40B4-BE49-F238E27FC236}">
-                <a16:creationId xmlns:a16="http://schemas.microsoft.com/office/drawing/2014/main" id="{BC8307D7-E7B8-4C0C-AF79-988E89063675}"/>
-              </a:ext>
-            </a:extLst>
-          </p:cNvPr>
-          <p:cNvSpPr>
-            <a:spLocks noGrp="1"/>
-          </p:cNvSpPr>
-          <p:nvPr>
-            <p:ph idx="1"/>
-          </p:nvPr>
-        </p:nvSpPr>
-        <p:spPr/>
-        <p:txBody>
-          <a:bodyPr>
-            <a:normAutofit/>
-          </a:bodyPr>
-          <a:lstStyle/>
-          <a:p>
-            <a:pPr>
-              <a:buFont typeface="Wingdings" panose="05000000000000000000" pitchFamily="2" charset="2"/>
-              <a:buChar char="l"/>
-            </a:pPr>
-            <a:endParaRPr lang="en-US" altLang="zh-CN" sz="3200" dirty="0"/>
-          </a:p>
-          <a:p>
-            <a:pPr>
-              <a:buFont typeface="Wingdings" panose="05000000000000000000" pitchFamily="2" charset="2"/>
-              <a:buChar char="l"/>
-            </a:pPr>
-            <a:r>
-              <a:rPr lang="en-US" altLang="zh-CN" sz="3200" dirty="0"/>
-              <a:t>History and software installation</a:t>
-            </a:r>
-          </a:p>
-          <a:p>
-            <a:pPr>
-              <a:buFont typeface="Wingdings" panose="05000000000000000000" pitchFamily="2" charset="2"/>
-              <a:buChar char="l"/>
-            </a:pPr>
-            <a:r>
-              <a:rPr lang="en-US" altLang="zh-CN" sz="3200" dirty="0"/>
-              <a:t>Input Files</a:t>
-            </a:r>
-          </a:p>
-          <a:p>
-            <a:pPr>
-              <a:buFont typeface="Wingdings" panose="05000000000000000000" pitchFamily="2" charset="2"/>
-              <a:buChar char="l"/>
-            </a:pPr>
-            <a:r>
-              <a:rPr lang="en-US" altLang="zh-CN" sz="3200" dirty="0"/>
-              <a:t>Typesetting Text</a:t>
-            </a:r>
-          </a:p>
-          <a:p>
-            <a:pPr>
-              <a:buFont typeface="Wingdings" panose="05000000000000000000" pitchFamily="2" charset="2"/>
-              <a:buChar char="l"/>
-            </a:pPr>
-            <a:r>
-              <a:rPr lang="en-US" altLang="zh-CN" sz="3200" dirty="0"/>
-              <a:t>Mathematical Formulae</a:t>
-            </a:r>
-          </a:p>
-          <a:p>
-            <a:pPr>
-              <a:buFont typeface="Wingdings" panose="05000000000000000000" pitchFamily="2" charset="2"/>
-              <a:buChar char="l"/>
-            </a:pPr>
-            <a:r>
-              <a:rPr lang="en-US" altLang="zh-CN" sz="3200" dirty="0"/>
-              <a:t>Specialties</a:t>
-            </a:r>
-          </a:p>
-        </p:txBody>
-      </p:sp>
-    </p:spTree>
-    <p:extLst>
-      <p:ext uri="{BB962C8B-B14F-4D97-AF65-F5344CB8AC3E}">
-        <p14:creationId xmlns:p14="http://schemas.microsoft.com/office/powerpoint/2010/main" val="1589704355"/>
-      </p:ext>
-    </p:extLst>
-  </p:cSld>
-  <p:clrMapOvr>
-    <a:masterClrMapping/>
-  </p:clrMapOvr>
-</p:sld>
-</file>
-
-<file path=ppt/slides/slide30.xml><?xml version="1.0" encoding="utf-8"?>
-<p:sld xmlns:a="http://schemas.openxmlformats.org/drawingml/2006/main" xmlns:r="http://schemas.openxmlformats.org/officeDocument/2006/relationships" xmlns:p="http://schemas.openxmlformats.org/presentationml/2006/main">
-  <p:cSld>
-    <p:spTree>
-      <p:nvGrpSpPr>
-        <p:cNvPr id="1" name=""/>
-        <p:cNvGrpSpPr/>
-        <p:nvPr/>
-      </p:nvGrpSpPr>
-      <p:grpSpPr>
-        <a:xfrm>
-          <a:off x="0" y="0"/>
-          <a:ext cx="0" cy="0"/>
-          <a:chOff x="0" y="0"/>
-          <a:chExt cx="0" cy="0"/>
-        </a:xfrm>
-      </p:grpSpPr>
-      <p:sp>
-        <p:nvSpPr>
-          <p:cNvPr id="2" name="标题 1">
-            <a:extLst>
-              <a:ext uri="{FF2B5EF4-FFF2-40B4-BE49-F238E27FC236}">
                 <a16:creationId xmlns:a16="http://schemas.microsoft.com/office/drawing/2014/main" id="{0B9AB2FE-4093-416B-AAE7-A4BEBBB4E2DB}"/>
               </a:ext>
             </a:extLst>
@@ -10896,7 +10962,7 @@
 </p:sld>
 </file>
 
-<file path=ppt/slides/slide31.xml><?xml version="1.0" encoding="utf-8"?>
+<file path=ppt/slides/slide32.xml><?xml version="1.0" encoding="utf-8"?>
 <p:sld xmlns:a="http://schemas.openxmlformats.org/drawingml/2006/main" xmlns:r="http://schemas.openxmlformats.org/officeDocument/2006/relationships" xmlns:p="http://schemas.openxmlformats.org/presentationml/2006/main">
   <p:cSld>
     <p:spTree>
@@ -11017,7 +11083,7 @@
 </p:sld>
 </file>
 
-<file path=ppt/slides/slide32.xml><?xml version="1.0" encoding="utf-8"?>
+<file path=ppt/slides/slide33.xml><?xml version="1.0" encoding="utf-8"?>
 <p:sld xmlns:a="http://schemas.openxmlformats.org/drawingml/2006/main" xmlns:r="http://schemas.openxmlformats.org/officeDocument/2006/relationships" xmlns:p="http://schemas.openxmlformats.org/presentationml/2006/main">
   <p:cSld>
     <p:spTree>
@@ -11108,7 +11174,7 @@
 </p:sld>
 </file>
 
-<file path=ppt/slides/slide33.xml><?xml version="1.0" encoding="utf-8"?>
+<file path=ppt/slides/slide34.xml><?xml version="1.0" encoding="utf-8"?>
 <p:sld xmlns:a="http://schemas.openxmlformats.org/drawingml/2006/main" xmlns:r="http://schemas.openxmlformats.org/officeDocument/2006/relationships" xmlns:p="http://schemas.openxmlformats.org/presentationml/2006/main">
   <p:cSld>
     <p:spTree>
@@ -11231,7 +11297,71 @@
 </p:sld>
 </file>
 
-<file path=ppt/slides/slide34.xml><?xml version="1.0" encoding="utf-8"?>
+<file path=ppt/slides/slide35.xml><?xml version="1.0" encoding="utf-8"?>
+<p:sld xmlns:a="http://schemas.openxmlformats.org/drawingml/2006/main" xmlns:r="http://schemas.openxmlformats.org/officeDocument/2006/relationships" xmlns:p="http://schemas.openxmlformats.org/presentationml/2006/main">
+  <p:cSld>
+    <p:spTree>
+      <p:nvGrpSpPr>
+        <p:cNvPr id="1" name=""/>
+        <p:cNvGrpSpPr/>
+        <p:nvPr/>
+      </p:nvGrpSpPr>
+      <p:grpSpPr>
+        <a:xfrm>
+          <a:off x="0" y="0"/>
+          <a:ext cx="0" cy="0"/>
+          <a:chOff x="0" y="0"/>
+          <a:chExt cx="0" cy="0"/>
+        </a:xfrm>
+      </p:grpSpPr>
+      <p:pic>
+        <p:nvPicPr>
+          <p:cNvPr id="7" name="图片 6">
+            <a:extLst>
+              <a:ext uri="{FF2B5EF4-FFF2-40B4-BE49-F238E27FC236}">
+                <a16:creationId xmlns:a16="http://schemas.microsoft.com/office/drawing/2014/main" id="{32A32B64-6CB0-457B-84A8-0ED13ADB167D}"/>
+              </a:ext>
+            </a:extLst>
+          </p:cNvPr>
+          <p:cNvPicPr>
+            <a:picLocks noChangeAspect="1"/>
+          </p:cNvPicPr>
+          <p:nvPr>
+            <p:custDataLst>
+              <p:tags r:id="rId1"/>
+            </p:custDataLst>
+          </p:nvPr>
+        </p:nvPicPr>
+        <p:blipFill>
+          <a:blip r:embed="rId3"/>
+          <a:stretch>
+            <a:fillRect/>
+          </a:stretch>
+        </p:blipFill>
+        <p:spPr>
+          <a:xfrm>
+            <a:off x="743472" y="2281816"/>
+            <a:ext cx="12584738" cy="3288134"/>
+          </a:xfrm>
+          <a:prstGeom prst="rect">
+            <a:avLst/>
+          </a:prstGeom>
+        </p:spPr>
+      </p:pic>
+    </p:spTree>
+    <p:extLst>
+      <p:ext uri="{BB962C8B-B14F-4D97-AF65-F5344CB8AC3E}">
+        <p14:creationId xmlns:p14="http://schemas.microsoft.com/office/powerpoint/2010/main" val="4172228059"/>
+      </p:ext>
+    </p:extLst>
+  </p:cSld>
+  <p:clrMapOvr>
+    <a:masterClrMapping/>
+  </p:clrMapOvr>
+</p:sld>
+</file>
+
+<file path=ppt/slides/slide36.xml><?xml version="1.0" encoding="utf-8"?>
 <p:sld xmlns:a="http://schemas.openxmlformats.org/drawingml/2006/main" xmlns:r="http://schemas.openxmlformats.org/officeDocument/2006/relationships" xmlns:p="http://schemas.openxmlformats.org/presentationml/2006/main">
   <p:cSld>
     <p:spTree>
@@ -11322,7 +11452,7 @@
 </p:sld>
 </file>
 
-<file path=ppt/slides/slide35.xml><?xml version="1.0" encoding="utf-8"?>
+<file path=ppt/slides/slide37.xml><?xml version="1.0" encoding="utf-8"?>
 <p:sld xmlns:a="http://schemas.openxmlformats.org/drawingml/2006/main" xmlns:r="http://schemas.openxmlformats.org/officeDocument/2006/relationships" xmlns:p="http://schemas.openxmlformats.org/presentationml/2006/main">
   <p:cSld>
     <p:spTree>
@@ -11525,7 +11655,7 @@
 </p:sld>
 </file>
 
-<file path=ppt/slides/slide36.xml><?xml version="1.0" encoding="utf-8"?>
+<file path=ppt/slides/slide38.xml><?xml version="1.0" encoding="utf-8"?>
 <p:sld xmlns:a="http://schemas.openxmlformats.org/drawingml/2006/main" xmlns:r="http://schemas.openxmlformats.org/officeDocument/2006/relationships" xmlns:p="http://schemas.openxmlformats.org/presentationml/2006/main">
   <p:cSld>
     <p:spTree>
@@ -11616,193 +11746,6 @@
 </p:sld>
 </file>
 
-<file path=ppt/slides/slide37.xml><?xml version="1.0" encoding="utf-8"?>
-<p:sld xmlns:a="http://schemas.openxmlformats.org/drawingml/2006/main" xmlns:r="http://schemas.openxmlformats.org/officeDocument/2006/relationships" xmlns:p="http://schemas.openxmlformats.org/presentationml/2006/main">
-  <p:cSld>
-    <p:spTree>
-      <p:nvGrpSpPr>
-        <p:cNvPr id="1" name=""/>
-        <p:cNvGrpSpPr/>
-        <p:nvPr/>
-      </p:nvGrpSpPr>
-      <p:grpSpPr>
-        <a:xfrm>
-          <a:off x="0" y="0"/>
-          <a:ext cx="0" cy="0"/>
-          <a:chOff x="0" y="0"/>
-          <a:chExt cx="0" cy="0"/>
-        </a:xfrm>
-      </p:grpSpPr>
-      <p:sp>
-        <p:nvSpPr>
-          <p:cNvPr id="2" name="标题 1">
-            <a:extLst>
-              <a:ext uri="{FF2B5EF4-FFF2-40B4-BE49-F238E27FC236}">
-                <a16:creationId xmlns:a16="http://schemas.microsoft.com/office/drawing/2014/main" id="{521AD368-9B06-4110-AA27-165FA0E48495}"/>
-              </a:ext>
-            </a:extLst>
-          </p:cNvPr>
-          <p:cNvSpPr>
-            <a:spLocks noGrp="1"/>
-          </p:cNvSpPr>
-          <p:nvPr>
-            <p:ph type="title"/>
-          </p:nvPr>
-        </p:nvSpPr>
-        <p:spPr/>
-        <p:txBody>
-          <a:bodyPr/>
-          <a:lstStyle/>
-          <a:p>
-            <a:r>
-              <a:rPr lang="en-GB" altLang="zh-CN" dirty="0"/>
-              <a:t>Lowercase Greek letters</a:t>
-            </a:r>
-            <a:endParaRPr lang="zh-CN" altLang="en-US" dirty="0"/>
-          </a:p>
-        </p:txBody>
-      </p:sp>
-      <p:sp>
-        <p:nvSpPr>
-          <p:cNvPr id="3" name="内容占位符 2">
-            <a:extLst>
-              <a:ext uri="{FF2B5EF4-FFF2-40B4-BE49-F238E27FC236}">
-                <a16:creationId xmlns:a16="http://schemas.microsoft.com/office/drawing/2014/main" id="{514F3810-5AD2-48E3-9CD9-DA1159701AC2}"/>
-              </a:ext>
-            </a:extLst>
-          </p:cNvPr>
-          <p:cNvSpPr>
-            <a:spLocks noGrp="1"/>
-          </p:cNvSpPr>
-          <p:nvPr>
-            <p:ph idx="1"/>
-          </p:nvPr>
-        </p:nvSpPr>
-        <p:spPr/>
-        <p:txBody>
-          <a:bodyPr>
-            <a:normAutofit/>
-          </a:bodyPr>
-          <a:lstStyle/>
-          <a:p>
-            <a:r>
-              <a:rPr lang="sv-SE" altLang="zh-CN" sz="3200" dirty="0"/>
-              <a:t>\alpha, \beta, \gamma, …,</a:t>
-            </a:r>
-          </a:p>
-          <a:p>
-            <a:r>
-              <a:rPr lang="sv-SE" altLang="zh-CN" sz="3200" dirty="0"/>
-              <a:t>uppercase letters are entered as \Gamma, \Delta,</a:t>
-            </a:r>
-            <a:endParaRPr lang="zh-CN" altLang="en-US" sz="3200" dirty="0"/>
-          </a:p>
-        </p:txBody>
-      </p:sp>
-    </p:spTree>
-    <p:extLst>
-      <p:ext uri="{BB962C8B-B14F-4D97-AF65-F5344CB8AC3E}">
-        <p14:creationId xmlns:p14="http://schemas.microsoft.com/office/powerpoint/2010/main" val="3018806152"/>
-      </p:ext>
-    </p:extLst>
-  </p:cSld>
-  <p:clrMapOvr>
-    <a:masterClrMapping/>
-  </p:clrMapOvr>
-</p:sld>
-</file>
-
-<file path=ppt/slides/slide38.xml><?xml version="1.0" encoding="utf-8"?>
-<p:sld xmlns:a="http://schemas.openxmlformats.org/drawingml/2006/main" xmlns:r="http://schemas.openxmlformats.org/officeDocument/2006/relationships" xmlns:p="http://schemas.openxmlformats.org/presentationml/2006/main">
-  <p:cSld>
-    <p:spTree>
-      <p:nvGrpSpPr>
-        <p:cNvPr id="1" name=""/>
-        <p:cNvGrpSpPr/>
-        <p:nvPr/>
-      </p:nvGrpSpPr>
-      <p:grpSpPr>
-        <a:xfrm>
-          <a:off x="0" y="0"/>
-          <a:ext cx="0" cy="0"/>
-          <a:chOff x="0" y="0"/>
-          <a:chExt cx="0" cy="0"/>
-        </a:xfrm>
-      </p:grpSpPr>
-      <p:sp>
-        <p:nvSpPr>
-          <p:cNvPr id="2" name="标题 1">
-            <a:extLst>
-              <a:ext uri="{FF2B5EF4-FFF2-40B4-BE49-F238E27FC236}">
-                <a16:creationId xmlns:a16="http://schemas.microsoft.com/office/drawing/2014/main" id="{65D42D1B-083C-4D6B-8793-36FCB66A6688}"/>
-              </a:ext>
-            </a:extLst>
-          </p:cNvPr>
-          <p:cNvSpPr>
-            <a:spLocks noGrp="1"/>
-          </p:cNvSpPr>
-          <p:nvPr>
-            <p:ph type="title"/>
-          </p:nvPr>
-        </p:nvSpPr>
-        <p:spPr/>
-        <p:txBody>
-          <a:bodyPr/>
-          <a:lstStyle/>
-          <a:p>
-            <a:r>
-              <a:rPr lang="en-GB" altLang="zh-CN" dirty="0"/>
-              <a:t>Exponents, Superscripts and Subscripts</a:t>
-            </a:r>
-            <a:endParaRPr lang="zh-CN" altLang="en-US" dirty="0"/>
-          </a:p>
-        </p:txBody>
-      </p:sp>
-      <p:pic>
-        <p:nvPicPr>
-          <p:cNvPr id="4" name="内容占位符 3">
-            <a:extLst>
-              <a:ext uri="{FF2B5EF4-FFF2-40B4-BE49-F238E27FC236}">
-                <a16:creationId xmlns:a16="http://schemas.microsoft.com/office/drawing/2014/main" id="{9FD258A6-D503-47AB-B80B-25DE59A1550F}"/>
-              </a:ext>
-            </a:extLst>
-          </p:cNvPr>
-          <p:cNvPicPr>
-            <a:picLocks noGrp="1" noChangeAspect="1"/>
-          </p:cNvPicPr>
-          <p:nvPr>
-            <p:ph idx="1"/>
-          </p:nvPr>
-        </p:nvPicPr>
-        <p:blipFill>
-          <a:blip r:embed="rId3"/>
-          <a:stretch>
-            <a:fillRect/>
-          </a:stretch>
-        </p:blipFill>
-        <p:spPr>
-          <a:xfrm>
-            <a:off x="817264" y="2924312"/>
-            <a:ext cx="10058400" cy="1759050"/>
-          </a:xfrm>
-          <a:prstGeom prst="rect">
-            <a:avLst/>
-          </a:prstGeom>
-        </p:spPr>
-      </p:pic>
-    </p:spTree>
-    <p:extLst>
-      <p:ext uri="{BB962C8B-B14F-4D97-AF65-F5344CB8AC3E}">
-        <p14:creationId xmlns:p14="http://schemas.microsoft.com/office/powerpoint/2010/main" val="3661812196"/>
-      </p:ext>
-    </p:extLst>
-  </p:cSld>
-  <p:clrMapOvr>
-    <a:masterClrMapping/>
-  </p:clrMapOvr>
-</p:sld>
-</file>
-
 <file path=ppt/slides/slide39.xml><?xml version="1.0" encoding="utf-8"?>
 <p:sld xmlns:a="http://schemas.openxmlformats.org/drawingml/2006/main" xmlns:r="http://schemas.openxmlformats.org/officeDocument/2006/relationships" xmlns:p="http://schemas.openxmlformats.org/presentationml/2006/main">
   <p:cSld>
@@ -11825,7 +11768,7 @@
           <p:cNvPr id="2" name="标题 1">
             <a:extLst>
               <a:ext uri="{FF2B5EF4-FFF2-40B4-BE49-F238E27FC236}">
-                <a16:creationId xmlns:a16="http://schemas.microsoft.com/office/drawing/2014/main" id="{0B9AB2FE-4093-416B-AAE7-A4BEBBB4E2DB}"/>
+                <a16:creationId xmlns:a16="http://schemas.microsoft.com/office/drawing/2014/main" id="{521AD368-9B06-4110-AA27-165FA0E48495}"/>
               </a:ext>
             </a:extLst>
           </p:cNvPr>
@@ -11843,7 +11786,7 @@
           <a:p>
             <a:r>
               <a:rPr lang="en-GB" altLang="zh-CN" dirty="0"/>
-              <a:t>Specialities</a:t>
+              <a:t>Lowercase Greek letters</a:t>
             </a:r>
             <a:endParaRPr lang="zh-CN" altLang="en-US" dirty="0"/>
           </a:p>
@@ -11851,10 +11794,10 @@
       </p:sp>
       <p:sp>
         <p:nvSpPr>
-          <p:cNvPr id="3" name="文本占位符 2">
+          <p:cNvPr id="3" name="内容占位符 2">
             <a:extLst>
               <a:ext uri="{FF2B5EF4-FFF2-40B4-BE49-F238E27FC236}">
-                <a16:creationId xmlns:a16="http://schemas.microsoft.com/office/drawing/2014/main" id="{81043F5E-A9C7-4F06-BDA3-5C7D4B49AAF7}"/>
+                <a16:creationId xmlns:a16="http://schemas.microsoft.com/office/drawing/2014/main" id="{514F3810-5AD2-48E3-9CD9-DA1159701AC2}"/>
               </a:ext>
             </a:extLst>
           </p:cNvPr>
@@ -11862,22 +11805,34 @@
             <a:spLocks noGrp="1"/>
           </p:cNvSpPr>
           <p:nvPr>
-            <p:ph type="body" idx="1"/>
-          </p:nvPr>
-        </p:nvSpPr>
-        <p:spPr/>
-        <p:txBody>
-          <a:bodyPr/>
-          <a:lstStyle/>
-          <a:p>
-            <a:endParaRPr lang="zh-CN" altLang="en-US" dirty="0"/>
+            <p:ph idx="1"/>
+          </p:nvPr>
+        </p:nvSpPr>
+        <p:spPr/>
+        <p:txBody>
+          <a:bodyPr>
+            <a:normAutofit/>
+          </a:bodyPr>
+          <a:lstStyle/>
+          <a:p>
+            <a:r>
+              <a:rPr lang="sv-SE" altLang="zh-CN" sz="3200" dirty="0"/>
+              <a:t>\alpha, \beta, \gamma, …,</a:t>
+            </a:r>
+          </a:p>
+          <a:p>
+            <a:r>
+              <a:rPr lang="sv-SE" altLang="zh-CN" sz="3200" dirty="0"/>
+              <a:t>uppercase letters are entered as \Gamma, \Delta,</a:t>
+            </a:r>
+            <a:endParaRPr lang="zh-CN" altLang="en-US" sz="3200" dirty="0"/>
           </a:p>
         </p:txBody>
       </p:sp>
     </p:spTree>
     <p:extLst>
       <p:ext uri="{BB962C8B-B14F-4D97-AF65-F5344CB8AC3E}">
-        <p14:creationId xmlns:p14="http://schemas.microsoft.com/office/powerpoint/2010/main" val="2856053494"/>
+        <p14:creationId xmlns:p14="http://schemas.microsoft.com/office/powerpoint/2010/main" val="3018806152"/>
       </p:ext>
     </p:extLst>
   </p:cSld>
@@ -11969,6 +11924,181 @@
           <p:cNvPr id="2" name="标题 1">
             <a:extLst>
               <a:ext uri="{FF2B5EF4-FFF2-40B4-BE49-F238E27FC236}">
+                <a16:creationId xmlns:a16="http://schemas.microsoft.com/office/drawing/2014/main" id="{65D42D1B-083C-4D6B-8793-36FCB66A6688}"/>
+              </a:ext>
+            </a:extLst>
+          </p:cNvPr>
+          <p:cNvSpPr>
+            <a:spLocks noGrp="1"/>
+          </p:cNvSpPr>
+          <p:nvPr>
+            <p:ph type="title"/>
+          </p:nvPr>
+        </p:nvSpPr>
+        <p:spPr/>
+        <p:txBody>
+          <a:bodyPr/>
+          <a:lstStyle/>
+          <a:p>
+            <a:r>
+              <a:rPr lang="en-GB" altLang="zh-CN" dirty="0"/>
+              <a:t>Exponents, Superscripts and Subscripts</a:t>
+            </a:r>
+            <a:endParaRPr lang="zh-CN" altLang="en-US" dirty="0"/>
+          </a:p>
+        </p:txBody>
+      </p:sp>
+      <p:pic>
+        <p:nvPicPr>
+          <p:cNvPr id="4" name="内容占位符 3">
+            <a:extLst>
+              <a:ext uri="{FF2B5EF4-FFF2-40B4-BE49-F238E27FC236}">
+                <a16:creationId xmlns:a16="http://schemas.microsoft.com/office/drawing/2014/main" id="{9FD258A6-D503-47AB-B80B-25DE59A1550F}"/>
+              </a:ext>
+            </a:extLst>
+          </p:cNvPr>
+          <p:cNvPicPr>
+            <a:picLocks noGrp="1" noChangeAspect="1"/>
+          </p:cNvPicPr>
+          <p:nvPr>
+            <p:ph idx="1"/>
+          </p:nvPr>
+        </p:nvPicPr>
+        <p:blipFill>
+          <a:blip r:embed="rId3"/>
+          <a:stretch>
+            <a:fillRect/>
+          </a:stretch>
+        </p:blipFill>
+        <p:spPr>
+          <a:xfrm>
+            <a:off x="817264" y="2924312"/>
+            <a:ext cx="10058400" cy="1759050"/>
+          </a:xfrm>
+          <a:prstGeom prst="rect">
+            <a:avLst/>
+          </a:prstGeom>
+        </p:spPr>
+      </p:pic>
+    </p:spTree>
+    <p:extLst>
+      <p:ext uri="{BB962C8B-B14F-4D97-AF65-F5344CB8AC3E}">
+        <p14:creationId xmlns:p14="http://schemas.microsoft.com/office/powerpoint/2010/main" val="3661812196"/>
+      </p:ext>
+    </p:extLst>
+  </p:cSld>
+  <p:clrMapOvr>
+    <a:masterClrMapping/>
+  </p:clrMapOvr>
+</p:sld>
+</file>
+
+<file path=ppt/slides/slide41.xml><?xml version="1.0" encoding="utf-8"?>
+<p:sld xmlns:a="http://schemas.openxmlformats.org/drawingml/2006/main" xmlns:r="http://schemas.openxmlformats.org/officeDocument/2006/relationships" xmlns:p="http://schemas.openxmlformats.org/presentationml/2006/main">
+  <p:cSld>
+    <p:spTree>
+      <p:nvGrpSpPr>
+        <p:cNvPr id="1" name=""/>
+        <p:cNvGrpSpPr/>
+        <p:nvPr/>
+      </p:nvGrpSpPr>
+      <p:grpSpPr>
+        <a:xfrm>
+          <a:off x="0" y="0"/>
+          <a:ext cx="0" cy="0"/>
+          <a:chOff x="0" y="0"/>
+          <a:chExt cx="0" cy="0"/>
+        </a:xfrm>
+      </p:grpSpPr>
+      <p:sp>
+        <p:nvSpPr>
+          <p:cNvPr id="2" name="标题 1">
+            <a:extLst>
+              <a:ext uri="{FF2B5EF4-FFF2-40B4-BE49-F238E27FC236}">
+                <a16:creationId xmlns:a16="http://schemas.microsoft.com/office/drawing/2014/main" id="{0B9AB2FE-4093-416B-AAE7-A4BEBBB4E2DB}"/>
+              </a:ext>
+            </a:extLst>
+          </p:cNvPr>
+          <p:cNvSpPr>
+            <a:spLocks noGrp="1"/>
+          </p:cNvSpPr>
+          <p:nvPr>
+            <p:ph type="title"/>
+          </p:nvPr>
+        </p:nvSpPr>
+        <p:spPr/>
+        <p:txBody>
+          <a:bodyPr/>
+          <a:lstStyle/>
+          <a:p>
+            <a:r>
+              <a:rPr lang="en-GB" altLang="zh-CN" dirty="0"/>
+              <a:t>Specialities</a:t>
+            </a:r>
+            <a:endParaRPr lang="zh-CN" altLang="en-US" dirty="0"/>
+          </a:p>
+        </p:txBody>
+      </p:sp>
+      <p:sp>
+        <p:nvSpPr>
+          <p:cNvPr id="3" name="文本占位符 2">
+            <a:extLst>
+              <a:ext uri="{FF2B5EF4-FFF2-40B4-BE49-F238E27FC236}">
+                <a16:creationId xmlns:a16="http://schemas.microsoft.com/office/drawing/2014/main" id="{81043F5E-A9C7-4F06-BDA3-5C7D4B49AAF7}"/>
+              </a:ext>
+            </a:extLst>
+          </p:cNvPr>
+          <p:cNvSpPr>
+            <a:spLocks noGrp="1"/>
+          </p:cNvSpPr>
+          <p:nvPr>
+            <p:ph type="body" idx="1"/>
+          </p:nvPr>
+        </p:nvSpPr>
+        <p:spPr/>
+        <p:txBody>
+          <a:bodyPr/>
+          <a:lstStyle/>
+          <a:p>
+            <a:endParaRPr lang="zh-CN" altLang="en-US" dirty="0"/>
+          </a:p>
+        </p:txBody>
+      </p:sp>
+    </p:spTree>
+    <p:extLst>
+      <p:ext uri="{BB962C8B-B14F-4D97-AF65-F5344CB8AC3E}">
+        <p14:creationId xmlns:p14="http://schemas.microsoft.com/office/powerpoint/2010/main" val="2856053494"/>
+      </p:ext>
+    </p:extLst>
+  </p:cSld>
+  <p:clrMapOvr>
+    <a:masterClrMapping/>
+  </p:clrMapOvr>
+</p:sld>
+</file>
+
+<file path=ppt/slides/slide42.xml><?xml version="1.0" encoding="utf-8"?>
+<p:sld xmlns:a="http://schemas.openxmlformats.org/drawingml/2006/main" xmlns:r="http://schemas.openxmlformats.org/officeDocument/2006/relationships" xmlns:p="http://schemas.openxmlformats.org/presentationml/2006/main">
+  <p:cSld>
+    <p:spTree>
+      <p:nvGrpSpPr>
+        <p:cNvPr id="1" name=""/>
+        <p:cNvGrpSpPr/>
+        <p:nvPr/>
+      </p:nvGrpSpPr>
+      <p:grpSpPr>
+        <a:xfrm>
+          <a:off x="0" y="0"/>
+          <a:ext cx="0" cy="0"/>
+          <a:chOff x="0" y="0"/>
+          <a:chExt cx="0" cy="0"/>
+        </a:xfrm>
+      </p:grpSpPr>
+      <p:sp>
+        <p:nvSpPr>
+          <p:cNvPr id="2" name="标题 1">
+            <a:extLst>
+              <a:ext uri="{FF2B5EF4-FFF2-40B4-BE49-F238E27FC236}">
                 <a16:creationId xmlns:a16="http://schemas.microsoft.com/office/drawing/2014/main" id="{C635C24D-2413-4E91-89F8-745CDF46094D}"/>
               </a:ext>
             </a:extLst>
@@ -12098,7 +12228,7 @@
 </p:sld>
 </file>
 
-<file path=ppt/slides/slide41.xml><?xml version="1.0" encoding="utf-8"?>
+<file path=ppt/slides/slide43.xml><?xml version="1.0" encoding="utf-8"?>
 <p:sld xmlns:a="http://schemas.openxmlformats.org/drawingml/2006/main" xmlns:r="http://schemas.openxmlformats.org/officeDocument/2006/relationships" xmlns:p="http://schemas.openxmlformats.org/presentationml/2006/main">
   <p:cSld>
     <p:spTree>
@@ -12182,7 +12312,7 @@
 </p:sld>
 </file>
 
-<file path=ppt/slides/slide42.xml><?xml version="1.0" encoding="utf-8"?>
+<file path=ppt/slides/slide44.xml><?xml version="1.0" encoding="utf-8"?>
 <p:sld xmlns:a="http://schemas.openxmlformats.org/drawingml/2006/main" xmlns:r="http://schemas.openxmlformats.org/officeDocument/2006/relationships" xmlns:p="http://schemas.openxmlformats.org/presentationml/2006/main">
   <p:cSld>
     <p:spTree>
@@ -13112,6 +13242,44 @@
     <a:masterClrMapping/>
   </p:clrMapOvr>
 </p:sld>
+</file>
+
+<file path=ppt/tags/tag1.xml><?xml version="1.0" encoding="utf-8"?>
+<p:tagLst xmlns:a="http://schemas.openxmlformats.org/drawingml/2006/main" xmlns:r="http://schemas.openxmlformats.org/officeDocument/2006/relationships" xmlns:p="http://schemas.openxmlformats.org/presentationml/2006/main">
+  <p:tag name="OUTPUTDPI" val="1200"/>
+  <p:tag name="ORIGINALHEIGHT" val="110.25"/>
+  <p:tag name="ORIGINALWIDTH" val="1393.5"/>
+  <p:tag name="LATEXADDIN" val="\documentclass{article}&#10;\usepackage{amsmath}&#10;\pagestyle{empty}&#10;\begin{document}&#10;&#10;two {} spaces&#10;three {} {} spaces&#10;&#10;\end{document}"/>
+  <p:tag name="IGUANATEXSIZE" val="20"/>
+  <p:tag name="IGUANATEXCURSOR" val="114"/>
+  <p:tag name="TRANSPARENCY" val="True"/>
+  <p:tag name="FILENAME" val=""/>
+  <p:tag name="LATEXENGINEID" val="0"/>
+  <p:tag name="TEMPFOLDER" val="C:\Users\steve\"/>
+  <p:tag name="LATEXFORMHEIGHT" val="312"/>
+  <p:tag name="LATEXFORMWIDTH" val="384"/>
+  <p:tag name="LATEXFORMWRAP" val="True"/>
+  <p:tag name="BITMAPVECTOR" val="0"/>
+</p:tagLst>
+</file>
+
+<file path=ppt/tags/tag2.xml><?xml version="1.0" encoding="utf-8"?>
+<p:tagLst xmlns:a="http://schemas.openxmlformats.org/drawingml/2006/main" xmlns:r="http://schemas.openxmlformats.org/officeDocument/2006/relationships" xmlns:p="http://schemas.openxmlformats.org/presentationml/2006/main">
+  <p:tag name="OUTPUTDPI" val="1200"/>
+  <p:tag name="ORIGINALHEIGHT" val="291"/>
+  <p:tag name="ORIGINALWIDTH" val="1113.75"/>
+  <p:tag name="LATEXADDIN" val="\documentclass{article}&#10;\usepackage{amsmath}&#10;\pagestyle{empty}&#10;\begin{document}&#10;&#10;This is $d_{e_{e_p}}$.&#10;&#10;This line is less \smash{$d_{e_{e_p}}$}.&#10;&#10;&#10;\end{document}"/>
+  <p:tag name="IGUANATEXSIZE" val="20"/>
+  <p:tag name="IGUANATEXCURSOR" val="104"/>
+  <p:tag name="TRANSPARENCY" val="True"/>
+  <p:tag name="FILENAME" val=""/>
+  <p:tag name="LATEXENGINEID" val="0"/>
+  <p:tag name="TEMPFOLDER" val="C:\Users\steve\"/>
+  <p:tag name="LATEXFORMHEIGHT" val="312"/>
+  <p:tag name="LATEXFORMWIDTH" val="384"/>
+  <p:tag name="LATEXFORMWRAP" val="True"/>
+  <p:tag name="BITMAPVECTOR" val="0"/>
+</p:tagLst>
 </file>
 
 <file path=ppt/theme/theme1.xml><?xml version="1.0" encoding="utf-8"?>

</xml_diff>